<commit_message>
Fixed unit tests and documentation final edit done
</commit_message>
<xml_diff>
--- a/Documentation/Checkout_Architecture.pptx
+++ b/Documentation/Checkout_Architecture.pptx
@@ -198,7 +198,7 @@
           <a:p>
             <a:fld id="{06E21BD6-853D-4B95-9EE5-AC131BA6A4FA}" type="datetimeFigureOut">
               <a:rPr lang="en-GB" smtClean="0"/>
-              <a:t>31/03/2021</a:t>
+              <a:t>06/04/2021</a:t>
             </a:fld>
             <a:endParaRPr lang="en-GB"/>
           </a:p>
@@ -699,7 +699,7 @@
           <a:p>
             <a:fld id="{67F75B17-3089-40B7-961B-342D2EF8E70C}" type="datetimeFigureOut">
               <a:rPr lang="en-GB" smtClean="0"/>
-              <a:t>31/03/2021</a:t>
+              <a:t>06/04/2021</a:t>
             </a:fld>
             <a:endParaRPr lang="en-GB"/>
           </a:p>
@@ -899,7 +899,7 @@
           <a:p>
             <a:fld id="{67F75B17-3089-40B7-961B-342D2EF8E70C}" type="datetimeFigureOut">
               <a:rPr lang="en-GB" smtClean="0"/>
-              <a:t>31/03/2021</a:t>
+              <a:t>06/04/2021</a:t>
             </a:fld>
             <a:endParaRPr lang="en-GB"/>
           </a:p>
@@ -1109,7 +1109,7 @@
           <a:p>
             <a:fld id="{67F75B17-3089-40B7-961B-342D2EF8E70C}" type="datetimeFigureOut">
               <a:rPr lang="en-GB" smtClean="0"/>
-              <a:t>31/03/2021</a:t>
+              <a:t>06/04/2021</a:t>
             </a:fld>
             <a:endParaRPr lang="en-GB"/>
           </a:p>
@@ -1309,7 +1309,7 @@
           <a:p>
             <a:fld id="{67F75B17-3089-40B7-961B-342D2EF8E70C}" type="datetimeFigureOut">
               <a:rPr lang="en-GB" smtClean="0"/>
-              <a:t>31/03/2021</a:t>
+              <a:t>06/04/2021</a:t>
             </a:fld>
             <a:endParaRPr lang="en-GB"/>
           </a:p>
@@ -1585,7 +1585,7 @@
           <a:p>
             <a:fld id="{67F75B17-3089-40B7-961B-342D2EF8E70C}" type="datetimeFigureOut">
               <a:rPr lang="en-GB" smtClean="0"/>
-              <a:t>31/03/2021</a:t>
+              <a:t>06/04/2021</a:t>
             </a:fld>
             <a:endParaRPr lang="en-GB"/>
           </a:p>
@@ -1853,7 +1853,7 @@
           <a:p>
             <a:fld id="{67F75B17-3089-40B7-961B-342D2EF8E70C}" type="datetimeFigureOut">
               <a:rPr lang="en-GB" smtClean="0"/>
-              <a:t>31/03/2021</a:t>
+              <a:t>06/04/2021</a:t>
             </a:fld>
             <a:endParaRPr lang="en-GB"/>
           </a:p>
@@ -2268,7 +2268,7 @@
           <a:p>
             <a:fld id="{67F75B17-3089-40B7-961B-342D2EF8E70C}" type="datetimeFigureOut">
               <a:rPr lang="en-GB" smtClean="0"/>
-              <a:t>31/03/2021</a:t>
+              <a:t>06/04/2021</a:t>
             </a:fld>
             <a:endParaRPr lang="en-GB"/>
           </a:p>
@@ -2410,7 +2410,7 @@
           <a:p>
             <a:fld id="{67F75B17-3089-40B7-961B-342D2EF8E70C}" type="datetimeFigureOut">
               <a:rPr lang="en-GB" smtClean="0"/>
-              <a:t>31/03/2021</a:t>
+              <a:t>06/04/2021</a:t>
             </a:fld>
             <a:endParaRPr lang="en-GB"/>
           </a:p>
@@ -2523,7 +2523,7 @@
           <a:p>
             <a:fld id="{67F75B17-3089-40B7-961B-342D2EF8E70C}" type="datetimeFigureOut">
               <a:rPr lang="en-GB" smtClean="0"/>
-              <a:t>31/03/2021</a:t>
+              <a:t>06/04/2021</a:t>
             </a:fld>
             <a:endParaRPr lang="en-GB"/>
           </a:p>
@@ -2836,7 +2836,7 @@
           <a:p>
             <a:fld id="{67F75B17-3089-40B7-961B-342D2EF8E70C}" type="datetimeFigureOut">
               <a:rPr lang="en-GB" smtClean="0"/>
-              <a:t>31/03/2021</a:t>
+              <a:t>06/04/2021</a:t>
             </a:fld>
             <a:endParaRPr lang="en-GB"/>
           </a:p>
@@ -3125,7 +3125,7 @@
           <a:p>
             <a:fld id="{67F75B17-3089-40B7-961B-342D2EF8E70C}" type="datetimeFigureOut">
               <a:rPr lang="en-GB" smtClean="0"/>
-              <a:t>31/03/2021</a:t>
+              <a:t>06/04/2021</a:t>
             </a:fld>
             <a:endParaRPr lang="en-GB"/>
           </a:p>
@@ -3368,7 +3368,7 @@
           <a:p>
             <a:fld id="{67F75B17-3089-40B7-961B-342D2EF8E70C}" type="datetimeFigureOut">
               <a:rPr lang="en-GB" smtClean="0"/>
-              <a:t>31/03/2021</a:t>
+              <a:t>06/04/2021</a:t>
             </a:fld>
             <a:endParaRPr lang="en-GB"/>
           </a:p>
@@ -4114,7 +4114,7 @@
         </p:nvSpPr>
         <p:spPr>
           <a:xfrm>
-            <a:off x="7400403" y="3902486"/>
+            <a:off x="7400403" y="4074213"/>
             <a:ext cx="1027805" cy="543626"/>
           </a:xfrm>
           <a:prstGeom prst="can">
@@ -4497,7 +4497,7 @@
             <a:pPr algn="ctr"/>
             <a:r>
               <a:rPr lang="en-GB" dirty="0"/>
-              <a:t>Banks</a:t>
+              <a:t>Acquiring Bank</a:t>
             </a:r>
           </a:p>
         </p:txBody>
@@ -4630,7 +4630,7 @@
         </p:nvSpPr>
         <p:spPr>
           <a:xfrm>
-            <a:off x="9790943" y="2407679"/>
+            <a:off x="9857253" y="3486103"/>
             <a:ext cx="1025155" cy="775917"/>
           </a:xfrm>
           <a:prstGeom prst="roundRect">
@@ -4658,7 +4658,14 @@
             <a:pPr algn="ctr"/>
             <a:r>
               <a:rPr lang="en-GB" dirty="0"/>
-              <a:t>Bank1</a:t>
+              <a:t>Bank</a:t>
+            </a:r>
+          </a:p>
+          <a:p>
+            <a:pPr algn="ctr"/>
+            <a:r>
+              <a:rPr lang="en-GB" dirty="0"/>
+              <a:t>APIs</a:t>
             </a:r>
           </a:p>
         </p:txBody>
@@ -4707,100 +4714,6 @@
           </a:fontRef>
         </p:style>
       </p:cxnSp>
-      <p:sp>
-        <p:nvSpPr>
-          <p:cNvPr id="68" name="Rectangle: Rounded Corners 67">
-            <a:extLst>
-              <a:ext uri="{FF2B5EF4-FFF2-40B4-BE49-F238E27FC236}">
-                <a16:creationId xmlns:a16="http://schemas.microsoft.com/office/drawing/2014/main" id="{A850BC7D-D27D-4590-9232-33C00E0D94DF}"/>
-              </a:ext>
-            </a:extLst>
-          </p:cNvPr>
-          <p:cNvSpPr/>
-          <p:nvPr/>
-        </p:nvSpPr>
-        <p:spPr>
-          <a:xfrm>
-            <a:off x="9790943" y="3495435"/>
-            <a:ext cx="1025155" cy="814102"/>
-          </a:xfrm>
-          <a:prstGeom prst="roundRect">
-            <a:avLst/>
-          </a:prstGeom>
-        </p:spPr>
-        <p:style>
-          <a:lnRef idx="0">
-            <a:schemeClr val="accent4"/>
-          </a:lnRef>
-          <a:fillRef idx="3">
-            <a:schemeClr val="accent4"/>
-          </a:fillRef>
-          <a:effectRef idx="3">
-            <a:schemeClr val="accent4"/>
-          </a:effectRef>
-          <a:fontRef idx="minor">
-            <a:schemeClr val="lt1"/>
-          </a:fontRef>
-        </p:style>
-        <p:txBody>
-          <a:bodyPr rtlCol="0" anchor="ctr"/>
-          <a:lstStyle/>
-          <a:p>
-            <a:pPr algn="ctr"/>
-            <a:r>
-              <a:rPr lang="en-GB" dirty="0"/>
-              <a:t>Bank2</a:t>
-            </a:r>
-          </a:p>
-        </p:txBody>
-      </p:sp>
-      <p:sp>
-        <p:nvSpPr>
-          <p:cNvPr id="69" name="Rectangle: Rounded Corners 68">
-            <a:extLst>
-              <a:ext uri="{FF2B5EF4-FFF2-40B4-BE49-F238E27FC236}">
-                <a16:creationId xmlns:a16="http://schemas.microsoft.com/office/drawing/2014/main" id="{299F8910-47AE-4684-BB94-B51AB3CA7863}"/>
-              </a:ext>
-            </a:extLst>
-          </p:cNvPr>
-          <p:cNvSpPr/>
-          <p:nvPr/>
-        </p:nvSpPr>
-        <p:spPr>
-          <a:xfrm>
-            <a:off x="9826327" y="4558441"/>
-            <a:ext cx="1025155" cy="763418"/>
-          </a:xfrm>
-          <a:prstGeom prst="roundRect">
-            <a:avLst/>
-          </a:prstGeom>
-        </p:spPr>
-        <p:style>
-          <a:lnRef idx="0">
-            <a:schemeClr val="accent4"/>
-          </a:lnRef>
-          <a:fillRef idx="3">
-            <a:schemeClr val="accent4"/>
-          </a:fillRef>
-          <a:effectRef idx="3">
-            <a:schemeClr val="accent4"/>
-          </a:effectRef>
-          <a:fontRef idx="minor">
-            <a:schemeClr val="lt1"/>
-          </a:fontRef>
-        </p:style>
-        <p:txBody>
-          <a:bodyPr rtlCol="0" anchor="ctr"/>
-          <a:lstStyle/>
-          <a:p>
-            <a:pPr algn="ctr"/>
-            <a:r>
-              <a:rPr lang="en-GB" dirty="0"/>
-              <a:t>Bank3</a:t>
-            </a:r>
-          </a:p>
-        </p:txBody>
-      </p:sp>
       <p:sp>
         <p:nvSpPr>
           <p:cNvPr id="109" name="Rectangle: Rounded Corners 108">
@@ -5415,6 +5328,50 @@
           <a:xfrm>
             <a:off x="4263294" y="3874062"/>
             <a:ext cx="1633435" cy="2152"/>
+          </a:xfrm>
+          <a:prstGeom prst="straightConnector1">
+            <a:avLst/>
+          </a:prstGeom>
+          <a:ln>
+            <a:headEnd type="triangle"/>
+            <a:tailEnd type="triangle"/>
+          </a:ln>
+        </p:spPr>
+        <p:style>
+          <a:lnRef idx="1">
+            <a:schemeClr val="accent1"/>
+          </a:lnRef>
+          <a:fillRef idx="0">
+            <a:schemeClr val="accent1"/>
+          </a:fillRef>
+          <a:effectRef idx="0">
+            <a:schemeClr val="accent1"/>
+          </a:effectRef>
+          <a:fontRef idx="minor">
+            <a:schemeClr val="tx1"/>
+          </a:fontRef>
+        </p:style>
+      </p:cxnSp>
+      <p:cxnSp>
+        <p:nvCxnSpPr>
+          <p:cNvPr id="34" name="Straight Arrow Connector 33">
+            <a:extLst>
+              <a:ext uri="{FF2B5EF4-FFF2-40B4-BE49-F238E27FC236}">
+                <a16:creationId xmlns:a16="http://schemas.microsoft.com/office/drawing/2014/main" id="{AB6F095C-7BAB-42C8-AFC0-021C4A43A0C0}"/>
+              </a:ext>
+            </a:extLst>
+          </p:cNvPr>
+          <p:cNvCxnSpPr>
+            <a:cxnSpLocks/>
+            <a:stCxn id="10" idx="3"/>
+            <a:endCxn id="44" idx="1"/>
+          </p:cNvCxnSpPr>
+          <p:nvPr/>
+        </p:nvCxnSpPr>
+        <p:spPr>
+          <a:xfrm flipV="1">
+            <a:off x="6924534" y="3874062"/>
+            <a:ext cx="2932719" cy="2152"/>
           </a:xfrm>
           <a:prstGeom prst="straightConnector1">
             <a:avLst/>
@@ -6145,7 +6102,7 @@
         </p:nvSpPr>
         <p:spPr>
           <a:xfrm>
-            <a:off x="7705031" y="3828624"/>
+            <a:off x="7784286" y="3828624"/>
             <a:ext cx="1062592" cy="592013"/>
           </a:xfrm>
           <a:prstGeom prst="roundRect">
@@ -6331,7 +6288,7 @@
             <a:pPr algn="ctr"/>
             <a:r>
               <a:rPr lang="en-GB" dirty="0"/>
-              <a:t>Banks</a:t>
+              <a:t>Acquiring Bank</a:t>
             </a:r>
           </a:p>
         </p:txBody>
@@ -6446,53 +6403,6 @@
                 </a:solidFill>
               </a:rPr>
               <a:t>UI System</a:t>
-            </a:r>
-          </a:p>
-        </p:txBody>
-      </p:sp>
-      <p:sp>
-        <p:nvSpPr>
-          <p:cNvPr id="44" name="Rectangle: Rounded Corners 43">
-            <a:extLst>
-              <a:ext uri="{FF2B5EF4-FFF2-40B4-BE49-F238E27FC236}">
-                <a16:creationId xmlns:a16="http://schemas.microsoft.com/office/drawing/2014/main" id="{E3146B3C-2750-4A4C-9BFB-6575ADCFFE69}"/>
-              </a:ext>
-            </a:extLst>
-          </p:cNvPr>
-          <p:cNvSpPr/>
-          <p:nvPr/>
-        </p:nvSpPr>
-        <p:spPr>
-          <a:xfrm>
-            <a:off x="9770363" y="2631613"/>
-            <a:ext cx="1025155" cy="775917"/>
-          </a:xfrm>
-          <a:prstGeom prst="roundRect">
-            <a:avLst/>
-          </a:prstGeom>
-        </p:spPr>
-        <p:style>
-          <a:lnRef idx="0">
-            <a:schemeClr val="accent4"/>
-          </a:lnRef>
-          <a:fillRef idx="3">
-            <a:schemeClr val="accent4"/>
-          </a:fillRef>
-          <a:effectRef idx="3">
-            <a:schemeClr val="accent4"/>
-          </a:effectRef>
-          <a:fontRef idx="minor">
-            <a:schemeClr val="lt1"/>
-          </a:fontRef>
-        </p:style>
-        <p:txBody>
-          <a:bodyPr rtlCol="0" anchor="ctr"/>
-          <a:lstStyle/>
-          <a:p>
-            <a:pPr algn="ctr"/>
-            <a:r>
-              <a:rPr lang="en-GB" dirty="0"/>
-              <a:t>Bank1</a:t>
             </a:r>
           </a:p>
         </p:txBody>
@@ -6559,8 +6469,8 @@
         </p:nvCxnSpPr>
         <p:spPr>
           <a:xfrm>
-            <a:off x="8767623" y="4124631"/>
-            <a:ext cx="1002740" cy="1789"/>
+            <a:off x="8846878" y="4124631"/>
+            <a:ext cx="923485" cy="1789"/>
           </a:xfrm>
           <a:prstGeom prst="straightConnector1">
             <a:avLst/>
@@ -6627,146 +6537,11 @@
             <a:pPr algn="ctr"/>
             <a:r>
               <a:rPr lang="en-GB" dirty="0"/>
-              <a:t>Bank2</a:t>
-            </a:r>
-          </a:p>
-        </p:txBody>
-      </p:sp>
-      <p:sp>
-        <p:nvSpPr>
-          <p:cNvPr id="69" name="Rectangle: Rounded Corners 68">
-            <a:extLst>
-              <a:ext uri="{FF2B5EF4-FFF2-40B4-BE49-F238E27FC236}">
-                <a16:creationId xmlns:a16="http://schemas.microsoft.com/office/drawing/2014/main" id="{299F8910-47AE-4684-BB94-B51AB3CA7863}"/>
-              </a:ext>
-            </a:extLst>
-          </p:cNvPr>
-          <p:cNvSpPr/>
-          <p:nvPr/>
-        </p:nvSpPr>
-        <p:spPr>
-          <a:xfrm>
-            <a:off x="9805747" y="4782375"/>
-            <a:ext cx="1025155" cy="763418"/>
-          </a:xfrm>
-          <a:prstGeom prst="roundRect">
-            <a:avLst/>
-          </a:prstGeom>
-        </p:spPr>
-        <p:style>
-          <a:lnRef idx="0">
-            <a:schemeClr val="accent4"/>
-          </a:lnRef>
-          <a:fillRef idx="3">
-            <a:schemeClr val="accent4"/>
-          </a:fillRef>
-          <a:effectRef idx="3">
-            <a:schemeClr val="accent4"/>
-          </a:effectRef>
-          <a:fontRef idx="minor">
-            <a:schemeClr val="lt1"/>
-          </a:fontRef>
-        </p:style>
-        <p:txBody>
-          <a:bodyPr rtlCol="0" anchor="ctr"/>
-          <a:lstStyle/>
-          <a:p>
-            <a:pPr algn="ctr"/>
-            <a:r>
-              <a:rPr lang="en-GB" dirty="0"/>
-              <a:t>Bank3</a:t>
-            </a:r>
-          </a:p>
-        </p:txBody>
-      </p:sp>
-      <p:cxnSp>
-        <p:nvCxnSpPr>
-          <p:cNvPr id="1035" name="Connector: Elbow 1034">
-            <a:extLst>
-              <a:ext uri="{FF2B5EF4-FFF2-40B4-BE49-F238E27FC236}">
-                <a16:creationId xmlns:a16="http://schemas.microsoft.com/office/drawing/2014/main" id="{9C0AA636-448A-4D83-AF37-EDD803EB7DF3}"/>
-              </a:ext>
-            </a:extLst>
-          </p:cNvPr>
-          <p:cNvCxnSpPr>
-            <a:cxnSpLocks/>
-            <a:stCxn id="44" idx="1"/>
-            <a:endCxn id="48" idx="0"/>
-          </p:cNvCxnSpPr>
-          <p:nvPr/>
-        </p:nvCxnSpPr>
-        <p:spPr>
-          <a:xfrm rot="10800000" flipV="1">
-            <a:off x="8236327" y="3019572"/>
-            <a:ext cx="1534036" cy="809052"/>
-          </a:xfrm>
-          <a:prstGeom prst="bentConnector2">
-            <a:avLst/>
-          </a:prstGeom>
-          <a:ln>
-            <a:headEnd type="triangle"/>
-            <a:tailEnd type="triangle"/>
-          </a:ln>
-        </p:spPr>
-        <p:style>
-          <a:lnRef idx="1">
-            <a:schemeClr val="accent1"/>
-          </a:lnRef>
-          <a:fillRef idx="0">
-            <a:schemeClr val="accent1"/>
-          </a:fillRef>
-          <a:effectRef idx="0">
-            <a:schemeClr val="accent1"/>
-          </a:effectRef>
-          <a:fontRef idx="minor">
-            <a:schemeClr val="tx1"/>
-          </a:fontRef>
-        </p:style>
-      </p:cxnSp>
-      <p:cxnSp>
-        <p:nvCxnSpPr>
-          <p:cNvPr id="1042" name="Connector: Elbow 1041">
-            <a:extLst>
-              <a:ext uri="{FF2B5EF4-FFF2-40B4-BE49-F238E27FC236}">
-                <a16:creationId xmlns:a16="http://schemas.microsoft.com/office/drawing/2014/main" id="{D33C0F2E-A79E-4713-BFB9-4F177FAE50E2}"/>
-              </a:ext>
-            </a:extLst>
-          </p:cNvPr>
-          <p:cNvCxnSpPr>
-            <a:cxnSpLocks/>
-            <a:stCxn id="69" idx="1"/>
-            <a:endCxn id="48" idx="2"/>
-          </p:cNvCxnSpPr>
-          <p:nvPr/>
-        </p:nvCxnSpPr>
-        <p:spPr>
-          <a:xfrm rot="10800000">
-            <a:off x="8236327" y="4420638"/>
-            <a:ext cx="1569420" cy="743447"/>
-          </a:xfrm>
-          <a:prstGeom prst="bentConnector2">
-            <a:avLst/>
-          </a:prstGeom>
-          <a:ln>
-            <a:headEnd type="triangle"/>
-            <a:tailEnd type="triangle"/>
-          </a:ln>
-        </p:spPr>
-        <p:style>
-          <a:lnRef idx="1">
-            <a:schemeClr val="accent1"/>
-          </a:lnRef>
-          <a:fillRef idx="0">
-            <a:schemeClr val="accent1"/>
-          </a:fillRef>
-          <a:effectRef idx="0">
-            <a:schemeClr val="accent1"/>
-          </a:effectRef>
-          <a:fontRef idx="minor">
-            <a:schemeClr val="tx1"/>
-          </a:fontRef>
-        </p:style>
-      </p:cxnSp>
+              <a:t>Bank API</a:t>
+            </a:r>
+          </a:p>
+        </p:txBody>
+      </p:sp>
       <p:sp>
         <p:nvSpPr>
           <p:cNvPr id="109" name="Rectangle: Rounded Corners 108">

</xml_diff>